<commit_message>
Edit text in home page
</commit_message>
<xml_diff>
--- a/Docs/Presentation_Game_Breakers.pptx
+++ b/Docs/Presentation_Game_Breakers.pptx
@@ -3000,7 +3000,7 @@
           <a:p>
             <a:fld id="{76FE08C2-436C-4E6C-99F1-36D69CB88047}" type="datetimeFigureOut">
               <a:rPr lang="bg-BG" smtClean="0"/>
-              <a:t>27.6.2022 г.</a:t>
+              <a:t>27.6.2022</a:t>
             </a:fld>
             <a:endParaRPr lang="bg-BG"/>
           </a:p>
@@ -3198,7 +3198,7 @@
           <a:p>
             <a:fld id="{76FE08C2-436C-4E6C-99F1-36D69CB88047}" type="datetimeFigureOut">
               <a:rPr lang="bg-BG" smtClean="0"/>
-              <a:t>27.6.2022 г.</a:t>
+              <a:t>27.6.2022</a:t>
             </a:fld>
             <a:endParaRPr lang="bg-BG"/>
           </a:p>
@@ -3406,7 +3406,7 @@
           <a:p>
             <a:fld id="{76FE08C2-436C-4E6C-99F1-36D69CB88047}" type="datetimeFigureOut">
               <a:rPr lang="bg-BG" smtClean="0"/>
-              <a:t>27.6.2022 г.</a:t>
+              <a:t>27.6.2022</a:t>
             </a:fld>
             <a:endParaRPr lang="bg-BG"/>
           </a:p>
@@ -3604,7 +3604,7 @@
           <a:p>
             <a:fld id="{76FE08C2-436C-4E6C-99F1-36D69CB88047}" type="datetimeFigureOut">
               <a:rPr lang="bg-BG" smtClean="0"/>
-              <a:t>27.6.2022 г.</a:t>
+              <a:t>27.6.2022</a:t>
             </a:fld>
             <a:endParaRPr lang="bg-BG"/>
           </a:p>
@@ -3879,7 +3879,7 @@
           <a:p>
             <a:fld id="{76FE08C2-436C-4E6C-99F1-36D69CB88047}" type="datetimeFigureOut">
               <a:rPr lang="bg-BG" smtClean="0"/>
-              <a:t>27.6.2022 г.</a:t>
+              <a:t>27.6.2022</a:t>
             </a:fld>
             <a:endParaRPr lang="bg-BG"/>
           </a:p>
@@ -4144,7 +4144,7 @@
           <a:p>
             <a:fld id="{76FE08C2-436C-4E6C-99F1-36D69CB88047}" type="datetimeFigureOut">
               <a:rPr lang="bg-BG" smtClean="0"/>
-              <a:t>27.6.2022 г.</a:t>
+              <a:t>27.6.2022</a:t>
             </a:fld>
             <a:endParaRPr lang="bg-BG"/>
           </a:p>
@@ -4556,7 +4556,7 @@
           <a:p>
             <a:fld id="{76FE08C2-436C-4E6C-99F1-36D69CB88047}" type="datetimeFigureOut">
               <a:rPr lang="bg-BG" smtClean="0"/>
-              <a:t>27.6.2022 г.</a:t>
+              <a:t>27.6.2022</a:t>
             </a:fld>
             <a:endParaRPr lang="bg-BG"/>
           </a:p>
@@ -4697,7 +4697,7 @@
           <a:p>
             <a:fld id="{76FE08C2-436C-4E6C-99F1-36D69CB88047}" type="datetimeFigureOut">
               <a:rPr lang="bg-BG" smtClean="0"/>
-              <a:t>27.6.2022 г.</a:t>
+              <a:t>27.6.2022</a:t>
             </a:fld>
             <a:endParaRPr lang="bg-BG"/>
           </a:p>
@@ -4810,7 +4810,7 @@
           <a:p>
             <a:fld id="{76FE08C2-436C-4E6C-99F1-36D69CB88047}" type="datetimeFigureOut">
               <a:rPr lang="bg-BG" smtClean="0"/>
-              <a:t>27.6.2022 г.</a:t>
+              <a:t>27.6.2022</a:t>
             </a:fld>
             <a:endParaRPr lang="bg-BG"/>
           </a:p>
@@ -5121,7 +5121,7 @@
           <a:p>
             <a:fld id="{76FE08C2-436C-4E6C-99F1-36D69CB88047}" type="datetimeFigureOut">
               <a:rPr lang="bg-BG" smtClean="0"/>
-              <a:t>27.6.2022 г.</a:t>
+              <a:t>27.6.2022</a:t>
             </a:fld>
             <a:endParaRPr lang="bg-BG"/>
           </a:p>
@@ -5409,7 +5409,7 @@
           <a:p>
             <a:fld id="{76FE08C2-436C-4E6C-99F1-36D69CB88047}" type="datetimeFigureOut">
               <a:rPr lang="bg-BG" smtClean="0"/>
-              <a:t>27.6.2022 г.</a:t>
+              <a:t>27.6.2022</a:t>
             </a:fld>
             <a:endParaRPr lang="bg-BG"/>
           </a:p>
@@ -5650,7 +5650,7 @@
           <a:p>
             <a:fld id="{76FE08C2-436C-4E6C-99F1-36D69CB88047}" type="datetimeFigureOut">
               <a:rPr lang="bg-BG" smtClean="0"/>
-              <a:t>27.6.2022 г.</a:t>
+              <a:t>27.6.2022</a:t>
             </a:fld>
             <a:endParaRPr lang="bg-BG"/>
           </a:p>
@@ -6236,43 +6236,6 @@
               <a:t>Game Breakers</a:t>
             </a:r>
             <a:endParaRPr lang="bg-BG" sz="4000">
-              <a:solidFill>
-                <a:schemeClr val="tx2"/>
-              </a:solidFill>
-            </a:endParaRPr>
-          </a:p>
-        </p:txBody>
-      </p:sp>
-      <p:sp>
-        <p:nvSpPr>
-          <p:cNvPr id="3" name="Подзаглавие 2">
-            <a:extLst>
-              <a:ext uri="{FF2B5EF4-FFF2-40B4-BE49-F238E27FC236}">
-                <a16:creationId xmlns:a16="http://schemas.microsoft.com/office/drawing/2014/main" id="{E037214F-184E-0A0B-A8BD-71B5174B252B}"/>
-              </a:ext>
-            </a:extLst>
-          </p:cNvPr>
-          <p:cNvSpPr>
-            <a:spLocks noGrp="1"/>
-          </p:cNvSpPr>
-          <p:nvPr>
-            <p:ph type="subTitle" idx="1"/>
-          </p:nvPr>
-        </p:nvSpPr>
-        <p:spPr>
-          <a:xfrm>
-            <a:off x="6590966" y="3428999"/>
-            <a:ext cx="4805691" cy="838831"/>
-          </a:xfrm>
-        </p:spPr>
-        <p:txBody>
-          <a:bodyPr anchor="b">
-            <a:normAutofit/>
-          </a:bodyPr>
-          <a:lstStyle/>
-          <a:p>
-            <a:pPr algn="l"/>
-            <a:endParaRPr lang="bg-BG" sz="2000">
               <a:solidFill>
                 <a:schemeClr val="tx2"/>
               </a:solidFill>

</xml_diff>